<commit_message>
ppts nomeados Arq. de Computadores ajuste 04042023
</commit_message>
<xml_diff>
--- a/01 Classes/Aula0 - Arquitetura de Computadores - Visão Geral.pptx
+++ b/01 Classes/Aula0 - Arquitetura de Computadores - Visão Geral.pptx
@@ -7308,7 +7308,7 @@
         <p:spPr>
           <a:xfrm>
             <a:off x="142865" y="1200150"/>
-            <a:ext cx="8865056" cy="3445001"/>
+            <a:ext cx="8865056" cy="3737370"/>
           </a:xfrm>
         </p:spPr>
         <p:txBody>
@@ -7344,7 +7344,7 @@
                 <a:latin typeface="Times New Roman" panose="02020603050405020304" pitchFamily="18" charset="0"/>
                 <a:cs typeface="Times New Roman" panose="02020603050405020304" pitchFamily="18" charset="0"/>
               </a:rPr>
-              <a:t>Elementos de cabeamento: Cabo coaxial. Cabo de fibra óptica. Cabo de par trançado. Repetidor. Transceptor.</a:t>
+              <a:t>Elementos de cabeamento: Cabo coaxial. Cabo de fibra óptica. Cabo de par trançado. Repetidor. Transceptor;</a:t>
             </a:r>
           </a:p>
           <a:p>
@@ -7360,7 +7360,7 @@
                 <a:latin typeface="Times New Roman" panose="02020603050405020304" pitchFamily="18" charset="0"/>
                 <a:cs typeface="Times New Roman" panose="02020603050405020304" pitchFamily="18" charset="0"/>
               </a:rPr>
-              <a:t>Estação de trabalho.</a:t>
+              <a:t>Estação de trabalho;</a:t>
             </a:r>
           </a:p>
           <a:p>
@@ -7376,7 +7376,117 @@
                 <a:latin typeface="Times New Roman" panose="02020603050405020304" pitchFamily="18" charset="0"/>
                 <a:cs typeface="Times New Roman" panose="02020603050405020304" pitchFamily="18" charset="0"/>
               </a:rPr>
-              <a:t>Placa de rede.</a:t>
+              <a:t>Placa de rede – </a:t>
+            </a:r>
+            <a:r>
+              <a:rPr lang="pt-BR" sz="2000" dirty="0" err="1">
+                <a:solidFill>
+                  <a:schemeClr val="tx1"/>
+                </a:solidFill>
+                <a:latin typeface="Times New Roman" panose="02020603050405020304" pitchFamily="18" charset="0"/>
+                <a:cs typeface="Times New Roman" panose="02020603050405020304" pitchFamily="18" charset="0"/>
+              </a:rPr>
+              <a:t>mac</a:t>
+            </a:r>
+            <a:r>
+              <a:rPr lang="pt-BR" sz="2000" dirty="0">
+                <a:solidFill>
+                  <a:schemeClr val="tx1"/>
+                </a:solidFill>
+                <a:latin typeface="Times New Roman" panose="02020603050405020304" pitchFamily="18" charset="0"/>
+                <a:cs typeface="Times New Roman" panose="02020603050405020304" pitchFamily="18" charset="0"/>
+              </a:rPr>
+              <a:t>(</a:t>
+            </a:r>
+            <a:r>
+              <a:rPr lang="pt-BR" sz="2000" b="1" dirty="0">
+                <a:solidFill>
+                  <a:schemeClr val="tx1"/>
+                </a:solidFill>
+                <a:latin typeface="Times New Roman" panose="02020603050405020304" pitchFamily="18" charset="0"/>
+                <a:cs typeface="Times New Roman" panose="02020603050405020304" pitchFamily="18" charset="0"/>
+              </a:rPr>
+              <a:t>media </a:t>
+            </a:r>
+            <a:r>
+              <a:rPr lang="pt-BR" sz="2000" b="1" dirty="0" err="1">
+                <a:solidFill>
+                  <a:schemeClr val="tx1"/>
+                </a:solidFill>
+                <a:latin typeface="Times New Roman" panose="02020603050405020304" pitchFamily="18" charset="0"/>
+                <a:cs typeface="Times New Roman" panose="02020603050405020304" pitchFamily="18" charset="0"/>
+              </a:rPr>
+              <a:t>access</a:t>
+            </a:r>
+            <a:r>
+              <a:rPr lang="pt-BR" sz="2000" b="1" dirty="0">
+                <a:solidFill>
+                  <a:schemeClr val="tx1"/>
+                </a:solidFill>
+                <a:latin typeface="Times New Roman" panose="02020603050405020304" pitchFamily="18" charset="0"/>
+                <a:cs typeface="Times New Roman" panose="02020603050405020304" pitchFamily="18" charset="0"/>
+              </a:rPr>
+              <a:t> </a:t>
+            </a:r>
+            <a:r>
+              <a:rPr lang="pt-BR" sz="2000" b="1" dirty="0" err="1">
+                <a:solidFill>
+                  <a:schemeClr val="tx1"/>
+                </a:solidFill>
+                <a:latin typeface="Times New Roman" panose="02020603050405020304" pitchFamily="18" charset="0"/>
+                <a:cs typeface="Times New Roman" panose="02020603050405020304" pitchFamily="18" charset="0"/>
+              </a:rPr>
+              <a:t>control</a:t>
+            </a:r>
+            <a:r>
+              <a:rPr lang="pt-BR" sz="2000" dirty="0">
+                <a:solidFill>
+                  <a:schemeClr val="tx1"/>
+                </a:solidFill>
+                <a:latin typeface="Times New Roman" panose="02020603050405020304" pitchFamily="18" charset="0"/>
+                <a:cs typeface="Times New Roman" panose="02020603050405020304" pitchFamily="18" charset="0"/>
+              </a:rPr>
+              <a:t>) - </a:t>
+            </a:r>
+            <a:r>
+              <a:rPr lang="pt-BR" sz="2000" dirty="0" err="1">
+                <a:solidFill>
+                  <a:schemeClr val="tx1"/>
+                </a:solidFill>
+                <a:latin typeface="Times New Roman" panose="02020603050405020304" pitchFamily="18" charset="0"/>
+                <a:cs typeface="Times New Roman" panose="02020603050405020304" pitchFamily="18" charset="0"/>
+              </a:rPr>
+              <a:t>getmac</a:t>
+            </a:r>
+            <a:r>
+              <a:rPr lang="pt-BR" sz="2000" dirty="0">
+                <a:solidFill>
+                  <a:schemeClr val="tx1"/>
+                </a:solidFill>
+                <a:latin typeface="Times New Roman" panose="02020603050405020304" pitchFamily="18" charset="0"/>
+                <a:cs typeface="Times New Roman" panose="02020603050405020304" pitchFamily="18" charset="0"/>
+              </a:rPr>
+              <a:t>; </a:t>
+            </a:r>
+            <a:r>
+              <a:rPr lang="pt-BR" sz="2000" dirty="0" err="1">
+                <a:solidFill>
+                  <a:schemeClr val="tx1"/>
+                </a:solidFill>
+                <a:latin typeface="Times New Roman" panose="02020603050405020304" pitchFamily="18" charset="0"/>
+                <a:cs typeface="Times New Roman" panose="02020603050405020304" pitchFamily="18" charset="0"/>
+              </a:rPr>
+              <a:t>getmac</a:t>
+            </a:r>
+            <a:r>
+              <a:rPr lang="pt-BR" sz="2000" dirty="0">
+                <a:solidFill>
+                  <a:schemeClr val="tx1"/>
+                </a:solidFill>
+                <a:latin typeface="Times New Roman" panose="02020603050405020304" pitchFamily="18" charset="0"/>
+                <a:cs typeface="Times New Roman" panose="02020603050405020304" pitchFamily="18" charset="0"/>
+              </a:rPr>
+              <a:t> /v;</a:t>
             </a:r>
           </a:p>
           <a:p>
@@ -7392,7 +7502,7 @@
                 <a:latin typeface="Times New Roman" panose="02020603050405020304" pitchFamily="18" charset="0"/>
                 <a:cs typeface="Times New Roman" panose="02020603050405020304" pitchFamily="18" charset="0"/>
               </a:rPr>
-              <a:t>Concentrador (hub)</a:t>
+              <a:t>Concentrador (hub - Lan); Comutador (switch - Lan);</a:t>
             </a:r>
           </a:p>
           <a:p>
@@ -7408,7 +7518,27 @@
                 <a:latin typeface="Times New Roman" panose="02020603050405020304" pitchFamily="18" charset="0"/>
                 <a:cs typeface="Times New Roman" panose="02020603050405020304" pitchFamily="18" charset="0"/>
               </a:rPr>
-              <a:t>Comutador (switch)</a:t>
+              <a:t>Roteador (</a:t>
+            </a:r>
+            <a:r>
+              <a:rPr lang="pt-BR" sz="2000" dirty="0" err="1">
+                <a:solidFill>
+                  <a:schemeClr val="tx1"/>
+                </a:solidFill>
+                <a:latin typeface="Times New Roman" panose="02020603050405020304" pitchFamily="18" charset="0"/>
+                <a:cs typeface="Times New Roman" panose="02020603050405020304" pitchFamily="18" charset="0"/>
+              </a:rPr>
+              <a:t>router</a:t>
+            </a:r>
+            <a:r>
+              <a:rPr lang="pt-BR" sz="2000" dirty="0">
+                <a:solidFill>
+                  <a:schemeClr val="tx1"/>
+                </a:solidFill>
+                <a:latin typeface="Times New Roman" panose="02020603050405020304" pitchFamily="18" charset="0"/>
+                <a:cs typeface="Times New Roman" panose="02020603050405020304" pitchFamily="18" charset="0"/>
+              </a:rPr>
+              <a:t>/gateway);</a:t>
             </a:r>
           </a:p>
           <a:p>
@@ -7424,27 +7554,7 @@
                 <a:latin typeface="Times New Roman" panose="02020603050405020304" pitchFamily="18" charset="0"/>
                 <a:cs typeface="Times New Roman" panose="02020603050405020304" pitchFamily="18" charset="0"/>
               </a:rPr>
-              <a:t>Roteador (</a:t>
-            </a:r>
-            <a:r>
-              <a:rPr lang="pt-BR" sz="2000" dirty="0" err="1">
-                <a:solidFill>
-                  <a:schemeClr val="tx1"/>
-                </a:solidFill>
-                <a:latin typeface="Times New Roman" panose="02020603050405020304" pitchFamily="18" charset="0"/>
-                <a:cs typeface="Times New Roman" panose="02020603050405020304" pitchFamily="18" charset="0"/>
-              </a:rPr>
-              <a:t>router</a:t>
-            </a:r>
-            <a:r>
-              <a:rPr lang="pt-BR" sz="2000" dirty="0">
-                <a:solidFill>
-                  <a:schemeClr val="tx1"/>
-                </a:solidFill>
-                <a:latin typeface="Times New Roman" panose="02020603050405020304" pitchFamily="18" charset="0"/>
-                <a:cs typeface="Times New Roman" panose="02020603050405020304" pitchFamily="18" charset="0"/>
-              </a:rPr>
-              <a:t>/gateway)</a:t>
+              <a:t>Modem;</a:t>
             </a:r>
           </a:p>
           <a:p>
@@ -7460,7 +7570,47 @@
                 <a:latin typeface="Times New Roman" panose="02020603050405020304" pitchFamily="18" charset="0"/>
                 <a:cs typeface="Times New Roman" panose="02020603050405020304" pitchFamily="18" charset="0"/>
               </a:rPr>
-              <a:t>Modem.</a:t>
+              <a:t>Porta de Ligação (gateway </a:t>
+            </a:r>
+            <a:r>
+              <a:rPr lang="pt-BR" sz="2000" dirty="0" err="1">
+                <a:solidFill>
+                  <a:schemeClr val="tx1"/>
+                </a:solidFill>
+                <a:latin typeface="Times New Roman" panose="02020603050405020304" pitchFamily="18" charset="0"/>
+                <a:cs typeface="Times New Roman" panose="02020603050405020304" pitchFamily="18" charset="0"/>
+              </a:rPr>
+              <a:t>router</a:t>
+            </a:r>
+            <a:r>
+              <a:rPr lang="pt-BR" sz="2000" dirty="0">
+                <a:solidFill>
+                  <a:schemeClr val="tx1"/>
+                </a:solidFill>
+                <a:latin typeface="Times New Roman" panose="02020603050405020304" pitchFamily="18" charset="0"/>
+                <a:cs typeface="Times New Roman" panose="02020603050405020304" pitchFamily="18" charset="0"/>
+              </a:rPr>
+              <a:t> - </a:t>
+            </a:r>
+            <a:r>
+              <a:rPr lang="pt-BR" sz="2000" dirty="0" err="1">
+                <a:solidFill>
+                  <a:schemeClr val="tx1"/>
+                </a:solidFill>
+                <a:latin typeface="Times New Roman" panose="02020603050405020304" pitchFamily="18" charset="0"/>
+                <a:cs typeface="Times New Roman" panose="02020603050405020304" pitchFamily="18" charset="0"/>
+              </a:rPr>
+              <a:t>Wan</a:t>
+            </a:r>
+            <a:r>
+              <a:rPr lang="pt-BR" sz="2000" dirty="0">
+                <a:solidFill>
+                  <a:schemeClr val="tx1"/>
+                </a:solidFill>
+                <a:latin typeface="Times New Roman" panose="02020603050405020304" pitchFamily="18" charset="0"/>
+                <a:cs typeface="Times New Roman" panose="02020603050405020304" pitchFamily="18" charset="0"/>
+              </a:rPr>
+              <a:t>);</a:t>
             </a:r>
           </a:p>
           <a:p>
@@ -7476,28 +7626,47 @@
                 <a:latin typeface="Times New Roman" panose="02020603050405020304" pitchFamily="18" charset="0"/>
                 <a:cs typeface="Times New Roman" panose="02020603050405020304" pitchFamily="18" charset="0"/>
               </a:rPr>
-              <a:t>Porta de Ligação (gateway </a:t>
-            </a:r>
-            <a:r>
-              <a:rPr lang="pt-BR" sz="2000" dirty="0" err="1">
+              <a:t>Backbone (</a:t>
+            </a:r>
+            <a:r>
+              <a:rPr lang="pt-BR" sz="2000" dirty="0">
                 <a:solidFill>
                   <a:schemeClr val="tx1"/>
                 </a:solidFill>
                 <a:latin typeface="Times New Roman" panose="02020603050405020304" pitchFamily="18" charset="0"/>
                 <a:cs typeface="Times New Roman" panose="02020603050405020304" pitchFamily="18" charset="0"/>
-              </a:rPr>
-              <a:t>router</a:t>
-            </a:r>
-            <a:r>
-              <a:rPr lang="pt-BR" sz="2000" dirty="0">
+                <a:hlinkClick r:id="rId3"/>
+              </a:rPr>
+              <a:t>https://submarinecablemap</a:t>
+            </a:r>
+            <a:r>
+              <a:rPr lang="pt-BR" sz="2000">
                 <a:solidFill>
                   <a:schemeClr val="tx1"/>
                 </a:solidFill>
                 <a:latin typeface="Times New Roman" panose="02020603050405020304" pitchFamily="18" charset="0"/>
                 <a:cs typeface="Times New Roman" panose="02020603050405020304" pitchFamily="18" charset="0"/>
-              </a:rPr>
-              <a:t>)</a:t>
-            </a:r>
+                <a:hlinkClick r:id="rId3"/>
+              </a:rPr>
+              <a:t>.com</a:t>
+            </a:r>
+            <a:r>
+              <a:rPr lang="pt-BR" sz="2000">
+                <a:solidFill>
+                  <a:schemeClr val="tx1"/>
+                </a:solidFill>
+                <a:latin typeface="Times New Roman" panose="02020603050405020304" pitchFamily="18" charset="0"/>
+                <a:cs typeface="Times New Roman" panose="02020603050405020304" pitchFamily="18" charset="0"/>
+              </a:rPr>
+              <a:t>). </a:t>
+            </a:r>
+            <a:endParaRPr lang="pt-BR" sz="2000" dirty="0">
+              <a:solidFill>
+                <a:schemeClr val="tx1"/>
+              </a:solidFill>
+              <a:latin typeface="Times New Roman" panose="02020603050405020304" pitchFamily="18" charset="0"/>
+              <a:cs typeface="Times New Roman" panose="02020603050405020304" pitchFamily="18" charset="0"/>
+            </a:endParaRPr>
           </a:p>
         </p:txBody>
       </p:sp>

</xml_diff>